<commit_message>
added reference to figures 3 and 4 in the hardware section.
</commit_message>
<xml_diff>
--- a/poster.pptx
+++ b/poster.pptx
@@ -106,7 +106,7 @@
   </p:defaultTextStyle>
   <p:extLst>
     <p:ext uri="{EFAFB233-063F-42B5-8137-9DF3F51BA10A}">
-      <p15:sldGuideLst xmlns:p15="http://schemas.microsoft.com/office/powerpoint/2012/main">
+      <p15:sldGuideLst xmlns:p15="http://schemas.microsoft.com/office/powerpoint/2012/main" xmlns="">
         <p15:guide id="1" orient="horz" pos="6912">
           <p15:clr>
             <a:srgbClr val="A4A3A4"/>
@@ -369,14 +369,14 @@
           </a:ln>
           <a:extLst>
             <a:ext uri="{909E8E84-426E-40dd-AFC4-6F175D3DCCD1}">
-              <a14:hiddenFill xmlns:a14="http://schemas.microsoft.com/office/drawing/2010/main" xmlns="">
+              <a14:hiddenFill xmlns:a14="http://schemas.microsoft.com/office/drawing/2010/main">
                 <a:solidFill>
                   <a:srgbClr val="FFFFFF"/>
                 </a:solidFill>
               </a14:hiddenFill>
             </a:ext>
             <a:ext uri="{91240B29-F687-4f45-9708-019B960494DF}">
-              <a14:hiddenLine xmlns:a14="http://schemas.microsoft.com/office/drawing/2010/main" xmlns="" w="9525">
+              <a14:hiddenLine xmlns:a14="http://schemas.microsoft.com/office/drawing/2010/main" w="9525">
                 <a:solidFill>
                   <a:srgbClr val="000000"/>
                 </a:solidFill>
@@ -1649,7 +1649,7 @@
   <p:timing>
     <p:tnLst>
       <p:par>
-        <p:cTn id="1" dur="indefinite" restart="never" nodeType="tmRoot"/>
+        <p:cTn xmlns:p14="http://schemas.microsoft.com/office/powerpoint/2010/main" id="1" dur="indefinite" restart="never" nodeType="tmRoot"/>
       </p:par>
     </p:tnLst>
   </p:timing>
@@ -1765,7 +1765,7 @@
           <a:p>
             <a:fld id="{985D6BDF-9D0E-4E2B-85B8-D8F4790360C9}" type="datetimeFigureOut">
               <a:rPr lang="en-US" smtClean="0"/>
-              <a:t>3/22/2015</a:t>
+              <a:t>3/22/15</a:t>
             </a:fld>
             <a:endParaRPr lang="en-US" dirty="0"/>
           </a:p>
@@ -1826,7 +1826,7 @@
   <p:timing>
     <p:tnLst>
       <p:par>
-        <p:cTn id="1" dur="indefinite" restart="never" nodeType="tmRoot"/>
+        <p:cTn xmlns:p14="http://schemas.microsoft.com/office/powerpoint/2010/main" id="1" dur="indefinite" restart="never" nodeType="tmRoot"/>
       </p:par>
     </p:tnLst>
   </p:timing>
@@ -1985,7 +1985,7 @@
           <a:p>
             <a:fld id="{985D6BDF-9D0E-4E2B-85B8-D8F4790360C9}" type="datetimeFigureOut">
               <a:rPr lang="en-US" smtClean="0"/>
-              <a:t>3/22/2015</a:t>
+              <a:t>3/22/15</a:t>
             </a:fld>
             <a:endParaRPr lang="en-US" dirty="0"/>
           </a:p>
@@ -2084,7 +2084,7 @@
   <p:timing>
     <p:tnLst>
       <p:par>
-        <p:cTn id="1" dur="indefinite" restart="never" nodeType="tmRoot"/>
+        <p:cTn xmlns:p14="http://schemas.microsoft.com/office/powerpoint/2010/main" id="1" dur="indefinite" restart="never" nodeType="tmRoot"/>
       </p:par>
     </p:tnLst>
   </p:timing>
@@ -2381,14 +2381,14 @@
           <a:effectLst/>
           <a:extLst>
             <a:ext uri="{909E8E84-426E-40dd-AFC4-6F175D3DCCD1}">
-              <a14:hiddenFill xmlns:a14="http://schemas.microsoft.com/office/drawing/2010/main" xmlns="">
+              <a14:hiddenFill xmlns:a14="http://schemas.microsoft.com/office/drawing/2010/main">
                 <a:solidFill>
                   <a:schemeClr val="accent1"/>
                 </a:solidFill>
               </a14:hiddenFill>
             </a:ext>
             <a:ext uri="{91240B29-F687-4f45-9708-019B960494DF}">
-              <a14:hiddenLine xmlns:a14="http://schemas.microsoft.com/office/drawing/2010/main" xmlns="" w="9525">
+              <a14:hiddenLine xmlns:a14="http://schemas.microsoft.com/office/drawing/2010/main" w="9525">
                 <a:solidFill>
                   <a:schemeClr val="tx1"/>
                 </a:solidFill>
@@ -2398,7 +2398,7 @@
               </a14:hiddenLine>
             </a:ext>
             <a:ext uri="{AF507438-7753-43e0-B8FC-AC1667EBCBE1}">
-              <a14:hiddenEffects xmlns:a14="http://schemas.microsoft.com/office/drawing/2010/main" xmlns="">
+              <a14:hiddenEffects xmlns:a14="http://schemas.microsoft.com/office/drawing/2010/main">
                 <a:effectLst>
                   <a:outerShdw dist="35921" dir="2700000" algn="ctr" rotWithShape="0">
                     <a:schemeClr val="bg2"/>
@@ -2550,14 +2550,14 @@
           <a:effectLst/>
           <a:extLst>
             <a:ext uri="{909E8E84-426E-40dd-AFC4-6F175D3DCCD1}">
-              <a14:hiddenFill xmlns:a14="http://schemas.microsoft.com/office/drawing/2010/main" xmlns="">
+              <a14:hiddenFill xmlns:a14="http://schemas.microsoft.com/office/drawing/2010/main">
                 <a:solidFill>
                   <a:schemeClr val="accent1"/>
                 </a:solidFill>
               </a14:hiddenFill>
             </a:ext>
             <a:ext uri="{91240B29-F687-4f45-9708-019B960494DF}">
-              <a14:hiddenLine xmlns:a14="http://schemas.microsoft.com/office/drawing/2010/main" xmlns="" w="9525">
+              <a14:hiddenLine xmlns:a14="http://schemas.microsoft.com/office/drawing/2010/main" w="9525">
                 <a:solidFill>
                   <a:schemeClr val="tx1"/>
                 </a:solidFill>
@@ -2567,7 +2567,7 @@
               </a14:hiddenLine>
             </a:ext>
             <a:ext uri="{AF507438-7753-43e0-B8FC-AC1667EBCBE1}">
-              <a14:hiddenEffects xmlns:a14="http://schemas.microsoft.com/office/drawing/2010/main" xmlns="">
+              <a14:hiddenEffects xmlns:a14="http://schemas.microsoft.com/office/drawing/2010/main">
                 <a:effectLst>
                   <a:outerShdw dist="35921" dir="2700000" algn="ctr" rotWithShape="0">
                     <a:schemeClr val="bg2"/>
@@ -3102,7 +3102,7 @@
         <p:spPr bwMode="auto">
           <a:xfrm>
             <a:off x="22021800" y="3657597"/>
-            <a:ext cx="9875520" cy="843546"/>
+            <a:ext cx="9875520" cy="1489877"/>
           </a:xfrm>
           <a:prstGeom prst="rect">
             <a:avLst/>
@@ -3227,8 +3227,35 @@
               <a:rPr lang="en-US" sz="2100" dirty="0">
                 <a:latin typeface="Calibri" pitchFamily="34" charset="0"/>
               </a:rPr>
-              <a:t>The hardware for the robot is kept as simple as possible so as to make it robust and for the most cost effective solution. </a:t>
-            </a:r>
+              <a:t>The hardware for the robot is kept as simple as possible so as to make it robust and for the most cost effective solution</a:t>
+            </a:r>
+            <a:r>
+              <a:rPr lang="en-US" sz="2100" dirty="0" smtClean="0">
+                <a:latin typeface="Calibri" pitchFamily="34" charset="0"/>
+              </a:rPr>
+              <a:t>. Figure 3 shows the specification of the </a:t>
+            </a:r>
+            <a:r>
+              <a:rPr lang="en-US" sz="2100" dirty="0" err="1" smtClean="0">
+                <a:latin typeface="Calibri" pitchFamily="34" charset="0"/>
+              </a:rPr>
+              <a:t>Antz</a:t>
+            </a:r>
+            <a:r>
+              <a:rPr lang="en-US" sz="2100" dirty="0" smtClean="0">
+                <a:latin typeface="Calibri" pitchFamily="34" charset="0"/>
+              </a:rPr>
+              <a:t> robot we designed. Figure 4 is a high-level overview of how the hardware components </a:t>
+            </a:r>
+            <a:r>
+              <a:rPr lang="en-US" sz="2100" smtClean="0">
+                <a:latin typeface="Calibri" pitchFamily="34" charset="0"/>
+              </a:rPr>
+              <a:t>work together.</a:t>
+            </a:r>
+            <a:endParaRPr lang="en-US" sz="2100" dirty="0">
+              <a:latin typeface="Calibri" pitchFamily="34" charset="0"/>
+            </a:endParaRPr>
           </a:p>
         </p:txBody>
       </p:sp>
@@ -3775,14 +3802,14 @@
           <a:effectLst/>
           <a:extLst>
             <a:ext uri="{909E8E84-426E-40dd-AFC4-6F175D3DCCD1}">
-              <a14:hiddenFill xmlns:a14="http://schemas.microsoft.com/office/drawing/2010/main" xmlns="">
+              <a14:hiddenFill xmlns:a14="http://schemas.microsoft.com/office/drawing/2010/main">
                 <a:solidFill>
                   <a:schemeClr val="accent1"/>
                 </a:solidFill>
               </a14:hiddenFill>
             </a:ext>
             <a:ext uri="{91240B29-F687-4f45-9708-019B960494DF}">
-              <a14:hiddenLine xmlns:a14="http://schemas.microsoft.com/office/drawing/2010/main" xmlns="" w="9525">
+              <a14:hiddenLine xmlns:a14="http://schemas.microsoft.com/office/drawing/2010/main" w="9525">
                 <a:solidFill>
                   <a:schemeClr val="tx1"/>
                 </a:solidFill>
@@ -3792,7 +3819,7 @@
               </a14:hiddenLine>
             </a:ext>
             <a:ext uri="{AF507438-7753-43e0-B8FC-AC1667EBCBE1}">
-              <a14:hiddenEffects xmlns:a14="http://schemas.microsoft.com/office/drawing/2010/main" xmlns="">
+              <a14:hiddenEffects xmlns:a14="http://schemas.microsoft.com/office/drawing/2010/main">
                 <a:effectLst>
                   <a:outerShdw dist="35921" dir="2700000" algn="ctr" rotWithShape="0">
                     <a:schemeClr val="bg2"/>
@@ -4131,14 +4158,14 @@
           <a:effectLst/>
           <a:extLst>
             <a:ext uri="{909E8E84-426E-40dd-AFC4-6F175D3DCCD1}">
-              <a14:hiddenFill xmlns:a14="http://schemas.microsoft.com/office/drawing/2010/main" xmlns="">
+              <a14:hiddenFill xmlns:a14="http://schemas.microsoft.com/office/drawing/2010/main">
                 <a:solidFill>
                   <a:schemeClr val="accent1"/>
                 </a:solidFill>
               </a14:hiddenFill>
             </a:ext>
             <a:ext uri="{91240B29-F687-4f45-9708-019B960494DF}">
-              <a14:hiddenLine xmlns:a14="http://schemas.microsoft.com/office/drawing/2010/main" xmlns="" w="9525">
+              <a14:hiddenLine xmlns:a14="http://schemas.microsoft.com/office/drawing/2010/main" w="9525">
                 <a:solidFill>
                   <a:schemeClr val="tx1"/>
                 </a:solidFill>
@@ -4148,7 +4175,7 @@
               </a14:hiddenLine>
             </a:ext>
             <a:ext uri="{AF507438-7753-43e0-B8FC-AC1667EBCBE1}">
-              <a14:hiddenEffects xmlns:a14="http://schemas.microsoft.com/office/drawing/2010/main" xmlns="">
+              <a14:hiddenEffects xmlns:a14="http://schemas.microsoft.com/office/drawing/2010/main">
                 <a:effectLst>
                   <a:outerShdw dist="35921" dir="2700000" algn="ctr" rotWithShape="0">
                     <a:schemeClr val="bg2"/>
@@ -4416,7 +4443,7 @@
         </p:blipFill>
         <p:spPr>
           <a:xfrm>
-            <a:off x="22021800" y="11811000"/>
+            <a:off x="22021800" y="13100305"/>
             <a:ext cx="9809018" cy="4495800"/>
           </a:xfrm>
           <a:prstGeom prst="rect">
@@ -4434,7 +4461,7 @@
         </p:nvSpPr>
         <p:spPr bwMode="auto">
           <a:xfrm>
-            <a:off x="25374600" y="16459200"/>
+            <a:off x="25374600" y="17748505"/>
             <a:ext cx="3806662" cy="310895"/>
           </a:xfrm>
           <a:prstGeom prst="rect">
@@ -4447,14 +4474,14 @@
           <a:effectLst/>
           <a:extLst>
             <a:ext uri="{909E8E84-426E-40dd-AFC4-6F175D3DCCD1}">
-              <a14:hiddenFill xmlns:a14="http://schemas.microsoft.com/office/drawing/2010/main" xmlns="">
+              <a14:hiddenFill xmlns:a14="http://schemas.microsoft.com/office/drawing/2010/main">
                 <a:solidFill>
                   <a:schemeClr val="accent1"/>
                 </a:solidFill>
               </a14:hiddenFill>
             </a:ext>
             <a:ext uri="{91240B29-F687-4f45-9708-019B960494DF}">
-              <a14:hiddenLine xmlns:a14="http://schemas.microsoft.com/office/drawing/2010/main" xmlns="" w="9525">
+              <a14:hiddenLine xmlns:a14="http://schemas.microsoft.com/office/drawing/2010/main" w="9525">
                 <a:solidFill>
                   <a:schemeClr val="tx1"/>
                 </a:solidFill>
@@ -4464,7 +4491,7 @@
               </a14:hiddenLine>
             </a:ext>
             <a:ext uri="{AF507438-7753-43e0-B8FC-AC1667EBCBE1}">
-              <a14:hiddenEffects xmlns:a14="http://schemas.microsoft.com/office/drawing/2010/main" xmlns="">
+              <a14:hiddenEffects xmlns:a14="http://schemas.microsoft.com/office/drawing/2010/main">
                 <a:effectLst>
                   <a:outerShdw dist="35921" dir="2700000" algn="ctr" rotWithShape="0">
                     <a:schemeClr val="bg2"/>
@@ -4612,7 +4639,7 @@
         </p:nvSpPr>
         <p:spPr bwMode="auto">
           <a:xfrm>
-            <a:off x="23088600" y="7953759"/>
+            <a:off x="24688800" y="8915400"/>
             <a:ext cx="3740626" cy="310895"/>
           </a:xfrm>
           <a:prstGeom prst="rect">
@@ -4625,14 +4652,14 @@
           <a:effectLst/>
           <a:extLst>
             <a:ext uri="{909E8E84-426E-40dd-AFC4-6F175D3DCCD1}">
-              <a14:hiddenFill xmlns:a14="http://schemas.microsoft.com/office/drawing/2010/main" xmlns="">
+              <a14:hiddenFill xmlns:a14="http://schemas.microsoft.com/office/drawing/2010/main">
                 <a:solidFill>
                   <a:schemeClr val="accent1"/>
                 </a:solidFill>
               </a14:hiddenFill>
             </a:ext>
             <a:ext uri="{91240B29-F687-4f45-9708-019B960494DF}">
-              <a14:hiddenLine xmlns:a14="http://schemas.microsoft.com/office/drawing/2010/main" xmlns="" w="9525">
+              <a14:hiddenLine xmlns:a14="http://schemas.microsoft.com/office/drawing/2010/main" w="9525">
                 <a:solidFill>
                   <a:schemeClr val="tx1"/>
                 </a:solidFill>
@@ -4642,7 +4669,7 @@
               </a14:hiddenLine>
             </a:ext>
             <a:ext uri="{AF507438-7753-43e0-B8FC-AC1667EBCBE1}">
-              <a14:hiddenEffects xmlns:a14="http://schemas.microsoft.com/office/drawing/2010/main" xmlns="">
+              <a14:hiddenEffects xmlns:a14="http://schemas.microsoft.com/office/drawing/2010/main">
                 <a:effectLst>
                   <a:outerShdw dist="35921" dir="2700000" algn="ctr" rotWithShape="0">
                     <a:schemeClr val="bg2"/>
@@ -5001,14 +5028,14 @@
           <a:effectLst/>
           <a:extLst>
             <a:ext uri="{909E8E84-426E-40dd-AFC4-6F175D3DCCD1}">
-              <a14:hiddenFill xmlns:a14="http://schemas.microsoft.com/office/drawing/2010/main" xmlns="">
+              <a14:hiddenFill xmlns:a14="http://schemas.microsoft.com/office/drawing/2010/main">
                 <a:solidFill>
                   <a:schemeClr val="accent1"/>
                 </a:solidFill>
               </a14:hiddenFill>
             </a:ext>
             <a:ext uri="{91240B29-F687-4f45-9708-019B960494DF}">
-              <a14:hiddenLine xmlns:a14="http://schemas.microsoft.com/office/drawing/2010/main" xmlns="" w="9525">
+              <a14:hiddenLine xmlns:a14="http://schemas.microsoft.com/office/drawing/2010/main" w="9525">
                 <a:solidFill>
                   <a:schemeClr val="tx1"/>
                 </a:solidFill>
@@ -5018,7 +5045,7 @@
               </a14:hiddenLine>
             </a:ext>
             <a:ext uri="{AF507438-7753-43e0-B8FC-AC1667EBCBE1}">
-              <a14:hiddenEffects xmlns:a14="http://schemas.microsoft.com/office/drawing/2010/main" xmlns="">
+              <a14:hiddenEffects xmlns:a14="http://schemas.microsoft.com/office/drawing/2010/main">
                 <a:effectLst>
                   <a:outerShdw dist="35921" dir="2700000" algn="ctr" rotWithShape="0">
                     <a:schemeClr val="bg2"/>
@@ -5173,14 +5200,14 @@
           <a:effectLst/>
           <a:extLst>
             <a:ext uri="{909E8E84-426E-40dd-AFC4-6F175D3DCCD1}">
-              <a14:hiddenFill xmlns:a14="http://schemas.microsoft.com/office/drawing/2010/main" xmlns="">
+              <a14:hiddenFill xmlns:a14="http://schemas.microsoft.com/office/drawing/2010/main">
                 <a:solidFill>
                   <a:schemeClr val="accent1"/>
                 </a:solidFill>
               </a14:hiddenFill>
             </a:ext>
             <a:ext uri="{91240B29-F687-4f45-9708-019B960494DF}">
-              <a14:hiddenLine xmlns:a14="http://schemas.microsoft.com/office/drawing/2010/main" xmlns="" w="9525">
+              <a14:hiddenLine xmlns:a14="http://schemas.microsoft.com/office/drawing/2010/main" w="9525">
                 <a:solidFill>
                   <a:schemeClr val="tx1"/>
                 </a:solidFill>
@@ -5190,7 +5217,7 @@
               </a14:hiddenLine>
             </a:ext>
             <a:ext uri="{AF507438-7753-43e0-B8FC-AC1667EBCBE1}">
-              <a14:hiddenEffects xmlns:a14="http://schemas.microsoft.com/office/drawing/2010/main" xmlns="">
+              <a14:hiddenEffects xmlns:a14="http://schemas.microsoft.com/office/drawing/2010/main">
                 <a:effectLst>
                   <a:outerShdw dist="35921" dir="2700000" algn="ctr" rotWithShape="0">
                     <a:schemeClr val="bg2"/>
@@ -5345,14 +5372,14 @@
           <a:effectLst/>
           <a:extLst>
             <a:ext uri="{909E8E84-426E-40dd-AFC4-6F175D3DCCD1}">
-              <a14:hiddenFill xmlns:a14="http://schemas.microsoft.com/office/drawing/2010/main" xmlns="">
+              <a14:hiddenFill xmlns:a14="http://schemas.microsoft.com/office/drawing/2010/main">
                 <a:solidFill>
                   <a:schemeClr val="accent1"/>
                 </a:solidFill>
               </a14:hiddenFill>
             </a:ext>
             <a:ext uri="{91240B29-F687-4f45-9708-019B960494DF}">
-              <a14:hiddenLine xmlns:a14="http://schemas.microsoft.com/office/drawing/2010/main" xmlns="" w="9525">
+              <a14:hiddenLine xmlns:a14="http://schemas.microsoft.com/office/drawing/2010/main" w="9525">
                 <a:solidFill>
                   <a:schemeClr val="tx1"/>
                 </a:solidFill>
@@ -5362,7 +5389,7 @@
               </a14:hiddenLine>
             </a:ext>
             <a:ext uri="{AF507438-7753-43e0-B8FC-AC1667EBCBE1}">
-              <a14:hiddenEffects xmlns:a14="http://schemas.microsoft.com/office/drawing/2010/main" xmlns="">
+              <a14:hiddenEffects xmlns:a14="http://schemas.microsoft.com/office/drawing/2010/main">
                 <a:effectLst>
                   <a:outerShdw dist="35921" dir="2700000" algn="ctr" rotWithShape="0">
                     <a:schemeClr val="bg2"/>
@@ -5532,14 +5559,14 @@
           <a:effectLst/>
           <a:extLst>
             <a:ext uri="{909E8E84-426E-40dd-AFC4-6F175D3DCCD1}">
-              <a14:hiddenFill xmlns:a14="http://schemas.microsoft.com/office/drawing/2010/main" xmlns="">
+              <a14:hiddenFill xmlns:a14="http://schemas.microsoft.com/office/drawing/2010/main">
                 <a:solidFill>
                   <a:schemeClr val="accent1"/>
                 </a:solidFill>
               </a14:hiddenFill>
             </a:ext>
             <a:ext uri="{91240B29-F687-4f45-9708-019B960494DF}">
-              <a14:hiddenLine xmlns:a14="http://schemas.microsoft.com/office/drawing/2010/main" xmlns="" w="9525">
+              <a14:hiddenLine xmlns:a14="http://schemas.microsoft.com/office/drawing/2010/main" w="9525">
                 <a:solidFill>
                   <a:schemeClr val="tx1"/>
                 </a:solidFill>
@@ -5549,7 +5576,7 @@
               </a14:hiddenLine>
             </a:ext>
             <a:ext uri="{AF507438-7753-43e0-B8FC-AC1667EBCBE1}">
-              <a14:hiddenEffects xmlns:a14="http://schemas.microsoft.com/office/drawing/2010/main" xmlns="">
+              <a14:hiddenEffects xmlns:a14="http://schemas.microsoft.com/office/drawing/2010/main">
                 <a:effectLst>
                   <a:outerShdw dist="35921" dir="2700000" algn="ctr" rotWithShape="0">
                     <a:schemeClr val="bg2"/>
@@ -5704,14 +5731,14 @@
           <a:effectLst/>
           <a:extLst>
             <a:ext uri="{909E8E84-426E-40dd-AFC4-6F175D3DCCD1}">
-              <a14:hiddenFill xmlns:a14="http://schemas.microsoft.com/office/drawing/2010/main" xmlns="">
+              <a14:hiddenFill xmlns:a14="http://schemas.microsoft.com/office/drawing/2010/main">
                 <a:solidFill>
                   <a:schemeClr val="accent1"/>
                 </a:solidFill>
               </a14:hiddenFill>
             </a:ext>
             <a:ext uri="{91240B29-F687-4f45-9708-019B960494DF}">
-              <a14:hiddenLine xmlns:a14="http://schemas.microsoft.com/office/drawing/2010/main" xmlns="" w="9525">
+              <a14:hiddenLine xmlns:a14="http://schemas.microsoft.com/office/drawing/2010/main" w="9525">
                 <a:solidFill>
                   <a:schemeClr val="tx1"/>
                 </a:solidFill>
@@ -5721,7 +5748,7 @@
               </a14:hiddenLine>
             </a:ext>
             <a:ext uri="{AF507438-7753-43e0-B8FC-AC1667EBCBE1}">
-              <a14:hiddenEffects xmlns:a14="http://schemas.microsoft.com/office/drawing/2010/main" xmlns="">
+              <a14:hiddenEffects xmlns:a14="http://schemas.microsoft.com/office/drawing/2010/main">
                 <a:effectLst>
                   <a:outerShdw dist="35921" dir="2700000" algn="ctr" rotWithShape="0">
                     <a:schemeClr val="bg2"/>
@@ -5885,14 +5912,14 @@
           <a:effectLst/>
           <a:extLst>
             <a:ext uri="{909E8E84-426E-40dd-AFC4-6F175D3DCCD1}">
-              <a14:hiddenFill xmlns:a14="http://schemas.microsoft.com/office/drawing/2010/main" xmlns="">
+              <a14:hiddenFill xmlns:a14="http://schemas.microsoft.com/office/drawing/2010/main">
                 <a:solidFill>
                   <a:schemeClr val="accent1"/>
                 </a:solidFill>
               </a14:hiddenFill>
             </a:ext>
             <a:ext uri="{91240B29-F687-4f45-9708-019B960494DF}">
-              <a14:hiddenLine xmlns:a14="http://schemas.microsoft.com/office/drawing/2010/main" xmlns="" w="9525">
+              <a14:hiddenLine xmlns:a14="http://schemas.microsoft.com/office/drawing/2010/main" w="9525">
                 <a:solidFill>
                   <a:schemeClr val="tx1"/>
                 </a:solidFill>
@@ -5902,7 +5929,7 @@
               </a14:hiddenLine>
             </a:ext>
             <a:ext uri="{AF507438-7753-43e0-B8FC-AC1667EBCBE1}">
-              <a14:hiddenEffects xmlns:a14="http://schemas.microsoft.com/office/drawing/2010/main" xmlns="">
+              <a14:hiddenEffects xmlns:a14="http://schemas.microsoft.com/office/drawing/2010/main">
                 <a:effectLst>
                   <a:outerShdw dist="35921" dir="2700000" algn="ctr" rotWithShape="0">
                     <a:schemeClr val="bg2"/>
@@ -6056,7 +6083,7 @@
         </p:blipFill>
         <p:spPr>
           <a:xfrm>
-            <a:off x="26723111" y="5048888"/>
+            <a:off x="26593800" y="5943600"/>
             <a:ext cx="5043813" cy="2852156"/>
           </a:xfrm>
           <a:prstGeom prst="rect">
@@ -6086,7 +6113,7 @@
         </p:blipFill>
         <p:spPr>
           <a:xfrm>
-            <a:off x="22021800" y="5152255"/>
+            <a:off x="22021800" y="6019800"/>
             <a:ext cx="4167954" cy="2748789"/>
           </a:xfrm>
           <a:prstGeom prst="rect">
@@ -6102,7 +6129,7 @@
         </p:nvSpPr>
         <p:spPr>
           <a:xfrm>
-            <a:off x="21917982" y="8475957"/>
+            <a:off x="21917982" y="9390357"/>
             <a:ext cx="10497874" cy="2708434"/>
           </a:xfrm>
           <a:prstGeom prst="rect">
@@ -6226,7 +6253,7 @@
   <p:timing>
     <p:tnLst>
       <p:par>
-        <p:cTn id="1" dur="indefinite" restart="never" nodeType="tmRoot"/>
+        <p:cTn xmlns:p14="http://schemas.microsoft.com/office/powerpoint/2010/main" id="1" dur="indefinite" restart="never" nodeType="tmRoot"/>
       </p:par>
     </p:tnLst>
   </p:timing>

</xml_diff>

<commit_message>
Dr. Oh added as author, added application areas
</commit_message>
<xml_diff>
--- a/poster.pptx
+++ b/poster.pptx
@@ -106,7 +106,7 @@
   </p:defaultTextStyle>
   <p:extLst>
     <p:ext uri="{EFAFB233-063F-42B5-8137-9DF3F51BA10A}">
-      <p15:sldGuideLst xmlns:p15="http://schemas.microsoft.com/office/powerpoint/2012/main" xmlns="">
+      <p15:sldGuideLst xmlns="" xmlns:p15="http://schemas.microsoft.com/office/powerpoint/2012/main">
         <p15:guide id="1" orient="horz" pos="6912">
           <p15:clr>
             <a:srgbClr val="A4A3A4"/>
@@ -2752,7 +2752,7 @@
               <a:t> Roy </a:t>
             </a:r>
             <a:r>
-              <a:rPr lang="en-US" sz="2700">
+              <a:rPr lang="en-US" sz="2700" dirty="0" err="1" smtClean="0">
                 <a:solidFill>
                   <a:schemeClr val="accent3">
                     <a:lumMod val="20000"/>
@@ -2761,7 +2761,19 @@
                 </a:solidFill>
                 <a:latin typeface="+mn-lt"/>
               </a:rPr>
-              <a:t>Puli </a:t>
+              <a:t>Puli</a:t>
+            </a:r>
+            <a:r>
+              <a:rPr lang="en-US" sz="2700" dirty="0" smtClean="0">
+                <a:solidFill>
+                  <a:schemeClr val="accent3">
+                    <a:lumMod val="20000"/>
+                    <a:lumOff val="80000"/>
+                  </a:schemeClr>
+                </a:solidFill>
+                <a:latin typeface="+mn-lt"/>
+              </a:rPr>
+              <a:t>, Jae C. Oh</a:t>
             </a:r>
             <a:endParaRPr lang="en-US" sz="2700" baseline="30000" dirty="0">
               <a:solidFill>
@@ -4443,7 +4455,7 @@
         </p:blipFill>
         <p:spPr>
           <a:xfrm>
-            <a:off x="22021800" y="13100305"/>
+            <a:off x="22021800" y="11271505"/>
             <a:ext cx="9809018" cy="4495800"/>
           </a:xfrm>
           <a:prstGeom prst="rect">
@@ -4461,7 +4473,7 @@
         </p:nvSpPr>
         <p:spPr bwMode="auto">
           <a:xfrm>
-            <a:off x="25374600" y="17748505"/>
+            <a:off x="25374600" y="15919705"/>
             <a:ext cx="3806662" cy="310895"/>
           </a:xfrm>
           <a:prstGeom prst="rect">
@@ -4639,7 +4651,7 @@
         </p:nvSpPr>
         <p:spPr bwMode="auto">
           <a:xfrm>
-            <a:off x="24688800" y="8915400"/>
+            <a:off x="24688800" y="8382000"/>
             <a:ext cx="3740626" cy="310895"/>
           </a:xfrm>
           <a:prstGeom prst="rect">
@@ -6083,7 +6095,7 @@
         </p:blipFill>
         <p:spPr>
           <a:xfrm>
-            <a:off x="26593800" y="5943600"/>
+            <a:off x="26593800" y="5410200"/>
             <a:ext cx="5043813" cy="2852156"/>
           </a:xfrm>
           <a:prstGeom prst="rect">
@@ -6113,7 +6125,7 @@
         </p:blipFill>
         <p:spPr>
           <a:xfrm>
-            <a:off x="22021800" y="6019800"/>
+            <a:off x="22021800" y="5486400"/>
             <a:ext cx="4167954" cy="2748789"/>
           </a:xfrm>
           <a:prstGeom prst="rect">
@@ -6129,7 +6141,7 @@
         </p:nvSpPr>
         <p:spPr>
           <a:xfrm>
-            <a:off x="21917982" y="9390357"/>
+            <a:off x="21917982" y="8645366"/>
             <a:ext cx="10497874" cy="2708434"/>
           </a:xfrm>
           <a:prstGeom prst="rect">
@@ -6237,6 +6249,259 @@
               <a:t> 2560 microcontroller by AVR. This was chosen because of its multiple timers and large number of pins. </a:t>
             </a:r>
             <a:endParaRPr lang="en-US" sz="1700" dirty="0"/>
+          </a:p>
+        </p:txBody>
+      </p:sp>
+      <p:sp>
+        <p:nvSpPr>
+          <p:cNvPr id="39" name="Text Box 194"/>
+          <p:cNvSpPr txBox="1">
+            <a:spLocks noChangeArrowheads="1"/>
+          </p:cNvSpPr>
+          <p:nvPr/>
+        </p:nvSpPr>
+        <p:spPr bwMode="auto">
+          <a:xfrm>
+            <a:off x="22021800" y="17144997"/>
+            <a:ext cx="9875520" cy="1489877"/>
+          </a:xfrm>
+          <a:prstGeom prst="rect">
+            <a:avLst/>
+          </a:prstGeom>
+          <a:solidFill>
+            <a:schemeClr val="bg1"/>
+          </a:solidFill>
+          <a:ln w="12700">
+            <a:solidFill>
+              <a:schemeClr val="accent1">
+                <a:lumMod val="75000"/>
+              </a:schemeClr>
+            </a:solidFill>
+          </a:ln>
+          <a:effectLst/>
+        </p:spPr>
+        <p:txBody>
+          <a:bodyPr lIns="97654" tIns="97654" rIns="97654" bIns="97654">
+            <a:spAutoFit/>
+          </a:bodyPr>
+          <a:lstStyle>
+            <a:lvl1pPr eaLnBrk="0" hangingPunct="0">
+              <a:defRPr sz="2200">
+                <a:solidFill>
+                  <a:schemeClr val="tx1"/>
+                </a:solidFill>
+                <a:latin typeface="Arial" charset="0"/>
+              </a:defRPr>
+            </a:lvl1pPr>
+            <a:lvl2pPr marL="742950" indent="-285750" eaLnBrk="0" hangingPunct="0">
+              <a:defRPr sz="2200">
+                <a:solidFill>
+                  <a:schemeClr val="tx1"/>
+                </a:solidFill>
+                <a:latin typeface="Arial" charset="0"/>
+              </a:defRPr>
+            </a:lvl2pPr>
+            <a:lvl3pPr marL="1143000" indent="-228600" eaLnBrk="0" hangingPunct="0">
+              <a:defRPr sz="2200">
+                <a:solidFill>
+                  <a:schemeClr val="tx1"/>
+                </a:solidFill>
+                <a:latin typeface="Arial" charset="0"/>
+              </a:defRPr>
+            </a:lvl3pPr>
+            <a:lvl4pPr marL="1600200" indent="-228600" eaLnBrk="0" hangingPunct="0">
+              <a:defRPr sz="2200">
+                <a:solidFill>
+                  <a:schemeClr val="tx1"/>
+                </a:solidFill>
+                <a:latin typeface="Arial" charset="0"/>
+              </a:defRPr>
+            </a:lvl4pPr>
+            <a:lvl5pPr marL="2057400" indent="-228600" eaLnBrk="0" hangingPunct="0">
+              <a:defRPr sz="2200">
+                <a:solidFill>
+                  <a:schemeClr val="tx1"/>
+                </a:solidFill>
+                <a:latin typeface="Arial" charset="0"/>
+              </a:defRPr>
+            </a:lvl5pPr>
+            <a:lvl6pPr marL="2514600" indent="-228600" eaLnBrk="0" fontAlgn="base" hangingPunct="0">
+              <a:spcBef>
+                <a:spcPct val="0"/>
+              </a:spcBef>
+              <a:spcAft>
+                <a:spcPct val="0"/>
+              </a:spcAft>
+              <a:defRPr sz="2200">
+                <a:solidFill>
+                  <a:schemeClr val="tx1"/>
+                </a:solidFill>
+                <a:latin typeface="Arial" charset="0"/>
+              </a:defRPr>
+            </a:lvl6pPr>
+            <a:lvl7pPr marL="2971800" indent="-228600" eaLnBrk="0" fontAlgn="base" hangingPunct="0">
+              <a:spcBef>
+                <a:spcPct val="0"/>
+              </a:spcBef>
+              <a:spcAft>
+                <a:spcPct val="0"/>
+              </a:spcAft>
+              <a:defRPr sz="2200">
+                <a:solidFill>
+                  <a:schemeClr val="tx1"/>
+                </a:solidFill>
+                <a:latin typeface="Arial" charset="0"/>
+              </a:defRPr>
+            </a:lvl7pPr>
+            <a:lvl8pPr marL="3429000" indent="-228600" eaLnBrk="0" fontAlgn="base" hangingPunct="0">
+              <a:spcBef>
+                <a:spcPct val="0"/>
+              </a:spcBef>
+              <a:spcAft>
+                <a:spcPct val="0"/>
+              </a:spcAft>
+              <a:defRPr sz="2200">
+                <a:solidFill>
+                  <a:schemeClr val="tx1"/>
+                </a:solidFill>
+                <a:latin typeface="Arial" charset="0"/>
+              </a:defRPr>
+            </a:lvl8pPr>
+            <a:lvl9pPr marL="3886200" indent="-228600" eaLnBrk="0" fontAlgn="base" hangingPunct="0">
+              <a:spcBef>
+                <a:spcPct val="0"/>
+              </a:spcBef>
+              <a:spcAft>
+                <a:spcPct val="0"/>
+              </a:spcAft>
+              <a:defRPr sz="2200">
+                <a:solidFill>
+                  <a:schemeClr val="tx1"/>
+                </a:solidFill>
+                <a:latin typeface="Arial" charset="0"/>
+              </a:defRPr>
+            </a:lvl9pPr>
+          </a:lstStyle>
+          <a:p>
+            <a:pPr eaLnBrk="1" hangingPunct="1"/>
+            <a:r>
+              <a:rPr lang="en-US" sz="2100" dirty="0" smtClean="0">
+                <a:latin typeface="Calibri" pitchFamily="34" charset="0"/>
+              </a:rPr>
+              <a:t>Swarm foraging algorithms such as ours can be applied in many </a:t>
+            </a:r>
+            <a:r>
+              <a:rPr lang="en-US" sz="2100" smtClean="0">
+                <a:latin typeface="Calibri" pitchFamily="34" charset="0"/>
+              </a:rPr>
+              <a:t>scenarios include:</a:t>
+            </a:r>
+            <a:endParaRPr lang="en-US" sz="2100" dirty="0" smtClean="0">
+              <a:latin typeface="Calibri" pitchFamily="34" charset="0"/>
+            </a:endParaRPr>
+          </a:p>
+          <a:p>
+            <a:pPr marL="342900" indent="-342900" eaLnBrk="1" hangingPunct="1">
+              <a:buFont typeface="Arial"/>
+              <a:buChar char="•"/>
+            </a:pPr>
+            <a:r>
+              <a:rPr lang="en-US" sz="2100" dirty="0" smtClean="0">
+                <a:latin typeface="Calibri" pitchFamily="34" charset="0"/>
+              </a:rPr>
+              <a:t>Search and rescue</a:t>
+            </a:r>
+          </a:p>
+          <a:p>
+            <a:pPr marL="342900" indent="-342900" eaLnBrk="1" hangingPunct="1">
+              <a:buFont typeface="Arial"/>
+              <a:buChar char="•"/>
+            </a:pPr>
+            <a:r>
+              <a:rPr lang="en-US" sz="2100" dirty="0" smtClean="0">
+                <a:latin typeface="Calibri" pitchFamily="34" charset="0"/>
+              </a:rPr>
+              <a:t>Surveillance</a:t>
+            </a:r>
+          </a:p>
+          <a:p>
+            <a:pPr marL="342900" indent="-342900" eaLnBrk="1" hangingPunct="1">
+              <a:buFont typeface="Arial"/>
+              <a:buChar char="•"/>
+            </a:pPr>
+            <a:r>
+              <a:rPr lang="en-US" sz="2100" dirty="0" smtClean="0">
+                <a:latin typeface="Calibri" pitchFamily="34" charset="0"/>
+              </a:rPr>
+              <a:t>Discovery of minerals in scientific missions</a:t>
+            </a:r>
+            <a:endParaRPr lang="en-US" sz="2100" dirty="0">
+              <a:latin typeface="Calibri" pitchFamily="34" charset="0"/>
+            </a:endParaRPr>
+          </a:p>
+        </p:txBody>
+      </p:sp>
+      <p:sp>
+        <p:nvSpPr>
+          <p:cNvPr id="40" name="Rectangle 39"/>
+          <p:cNvSpPr/>
+          <p:nvPr/>
+        </p:nvSpPr>
+        <p:spPr>
+          <a:xfrm>
+            <a:off x="22021800" y="16687800"/>
+            <a:ext cx="9875520" cy="457200"/>
+          </a:xfrm>
+          <a:prstGeom prst="rect">
+            <a:avLst/>
+          </a:prstGeom>
+          <a:solidFill>
+            <a:schemeClr val="accent1">
+              <a:lumMod val="75000"/>
+            </a:schemeClr>
+          </a:solidFill>
+          <a:ln w="12700"/>
+        </p:spPr>
+        <p:style>
+          <a:lnRef idx="2">
+            <a:schemeClr val="accent1">
+              <a:shade val="50000"/>
+            </a:schemeClr>
+          </a:lnRef>
+          <a:fillRef idx="1">
+            <a:schemeClr val="accent1"/>
+          </a:fillRef>
+          <a:effectRef idx="0">
+            <a:schemeClr val="accent1"/>
+          </a:effectRef>
+          <a:fontRef idx="minor">
+            <a:schemeClr val="lt1"/>
+          </a:fontRef>
+        </p:style>
+        <p:txBody>
+          <a:bodyPr lIns="48825" tIns="24404" rIns="48825" bIns="24404" rtlCol="0" anchor="ctr"/>
+          <a:lstStyle/>
+          <a:p>
+            <a:pPr algn="ctr"/>
+            <a:r>
+              <a:rPr lang="en-US" sz="3100" b="1" dirty="0" smtClean="0">
+                <a:solidFill>
+                  <a:schemeClr val="accent3">
+                    <a:lumMod val="20000"/>
+                    <a:lumOff val="80000"/>
+                  </a:schemeClr>
+                </a:solidFill>
+              </a:rPr>
+              <a:t>Application Areas</a:t>
+            </a:r>
+            <a:endParaRPr lang="en-US" sz="3100" b="1" dirty="0">
+              <a:solidFill>
+                <a:schemeClr val="accent3">
+                  <a:lumMod val="20000"/>
+                  <a:lumOff val="80000"/>
+                </a:schemeClr>
+              </a:solidFill>
+            </a:endParaRPr>
           </a:p>
         </p:txBody>
       </p:sp>

</xml_diff>